<commit_message>
Start content on portfolio + fiches
</commit_message>
<xml_diff>
--- a/yan_test_poster/yan_test_poster1.pptx
+++ b/yan_test_poster/yan_test_poster1.pptx
@@ -3333,7 +3333,7 @@
         </p:blipFill>
         <p:spPr>
           <a:xfrm>
-            <a:off x="688733" y="2879145"/>
+            <a:off x="688733" y="2850570"/>
             <a:ext cx="3247683" cy="3743325"/>
           </a:xfrm>
           <a:prstGeom prst="rect">
@@ -3364,7 +3364,7 @@
         </p:blipFill>
         <p:spPr>
           <a:xfrm>
-            <a:off x="4496175" y="2887951"/>
+            <a:off x="4496175" y="2859376"/>
             <a:ext cx="3262851" cy="3766944"/>
           </a:xfrm>
           <a:prstGeom prst="rect">
@@ -3395,7 +3395,7 @@
         </p:blipFill>
         <p:spPr>
           <a:xfrm>
-            <a:off x="8527808" y="2914650"/>
+            <a:off x="8527808" y="2886075"/>
             <a:ext cx="3247683" cy="3743325"/>
           </a:xfrm>
           <a:prstGeom prst="rect">

</xml_diff>